<commit_message>
Text and a few figures added to poster
</commit_message>
<xml_diff>
--- a/Clinic_poster_template_36x56.pptx
+++ b/Clinic_poster_template_36x56.pptx
@@ -4,10 +4,13 @@
   <p:sldMasterIdLst>
     <p:sldMasterId id="2147483648" r:id="rId1"/>
   </p:sldMasterIdLst>
+  <p:notesMasterIdLst>
+    <p:notesMasterId r:id="rId3"/>
+  </p:notesMasterIdLst>
   <p:sldIdLst>
     <p:sldId id="256" r:id="rId2"/>
   </p:sldIdLst>
-  <p:sldSz cx="32918400" cy="51206400"/>
+  <p:sldSz cx="51206400" cy="32918400"/>
   <p:notesSz cx="6858000" cy="9144000"/>
   <p:defaultTextStyle>
     <a:defPPr>
@@ -106,7 +109,7 @@
   </p:defaultTextStyle>
   <p:extLst>
     <p:ext uri="{EFAFB233-063F-42B5-8137-9DF3F51BA10A}">
-      <p15:sldGuideLst xmlns="" xmlns:p15="http://schemas.microsoft.com/office/powerpoint/2012/main">
+      <p15:sldGuideLst xmlns:p15="http://schemas.microsoft.com/office/powerpoint/2012/main" xmlns="">
         <p15:guide id="1" orient="horz" pos="16128" userDrawn="1">
           <p15:clr>
             <a:srgbClr val="A4A3A4"/>
@@ -121,6 +124,445 @@
     </p:ext>
   </p:extLst>
 </p:presentation>
+</file>
+
+<file path=ppt/notesMasters/notesMaster1.xml><?xml version="1.0" encoding="utf-8"?>
+<p:notesMaster xmlns:a="http://schemas.openxmlformats.org/drawingml/2006/main" xmlns:r="http://schemas.openxmlformats.org/officeDocument/2006/relationships" xmlns:p="http://schemas.openxmlformats.org/presentationml/2006/main">
+  <p:cSld>
+    <p:bg>
+      <p:bgRef idx="1001">
+        <a:schemeClr val="bg1"/>
+      </p:bgRef>
+    </p:bg>
+    <p:spTree>
+      <p:nvGrpSpPr>
+        <p:cNvPr id="1" name=""/>
+        <p:cNvGrpSpPr/>
+        <p:nvPr/>
+      </p:nvGrpSpPr>
+      <p:grpSpPr>
+        <a:xfrm>
+          <a:off x="0" y="0"/>
+          <a:ext cx="0" cy="0"/>
+          <a:chOff x="0" y="0"/>
+          <a:chExt cx="0" cy="0"/>
+        </a:xfrm>
+      </p:grpSpPr>
+      <p:sp>
+        <p:nvSpPr>
+          <p:cNvPr id="2" name="Header Placeholder 1"/>
+          <p:cNvSpPr>
+            <a:spLocks noGrp="1"/>
+          </p:cNvSpPr>
+          <p:nvPr>
+            <p:ph type="hdr" sz="quarter"/>
+          </p:nvPr>
+        </p:nvSpPr>
+        <p:spPr>
+          <a:xfrm>
+            <a:off x="0" y="0"/>
+            <a:ext cx="2971800" cy="457200"/>
+          </a:xfrm>
+          <a:prstGeom prst="rect">
+            <a:avLst/>
+          </a:prstGeom>
+        </p:spPr>
+        <p:txBody>
+          <a:bodyPr vert="horz" lIns="91440" tIns="45720" rIns="91440" bIns="45720" rtlCol="0"/>
+          <a:lstStyle>
+            <a:lvl1pPr algn="l">
+              <a:defRPr sz="1200"/>
+            </a:lvl1pPr>
+          </a:lstStyle>
+          <a:p>
+            <a:endParaRPr lang="en-US"/>
+          </a:p>
+        </p:txBody>
+      </p:sp>
+      <p:sp>
+        <p:nvSpPr>
+          <p:cNvPr id="3" name="Date Placeholder 2"/>
+          <p:cNvSpPr>
+            <a:spLocks noGrp="1"/>
+          </p:cNvSpPr>
+          <p:nvPr>
+            <p:ph type="dt" idx="1"/>
+          </p:nvPr>
+        </p:nvSpPr>
+        <p:spPr>
+          <a:xfrm>
+            <a:off x="3884613" y="0"/>
+            <a:ext cx="2971800" cy="457200"/>
+          </a:xfrm>
+          <a:prstGeom prst="rect">
+            <a:avLst/>
+          </a:prstGeom>
+        </p:spPr>
+        <p:txBody>
+          <a:bodyPr vert="horz" lIns="91440" tIns="45720" rIns="91440" bIns="45720" rtlCol="0"/>
+          <a:lstStyle>
+            <a:lvl1pPr algn="r">
+              <a:defRPr sz="1200"/>
+            </a:lvl1pPr>
+          </a:lstStyle>
+          <a:p>
+            <a:fld id="{9EC57B7F-6525-4D83-B81A-1F0DEB2D48E1}" type="datetimeFigureOut">
+              <a:rPr lang="en-US" smtClean="0"/>
+              <a:t>4/15/2015</a:t>
+            </a:fld>
+            <a:endParaRPr lang="en-US"/>
+          </a:p>
+        </p:txBody>
+      </p:sp>
+      <p:sp>
+        <p:nvSpPr>
+          <p:cNvPr id="4" name="Slide Image Placeholder 3"/>
+          <p:cNvSpPr>
+            <a:spLocks noGrp="1" noRot="1" noChangeAspect="1"/>
+          </p:cNvSpPr>
+          <p:nvPr>
+            <p:ph type="sldImg" idx="2"/>
+          </p:nvPr>
+        </p:nvSpPr>
+        <p:spPr>
+          <a:xfrm>
+            <a:off x="762000" y="685800"/>
+            <a:ext cx="5334000" cy="3429000"/>
+          </a:xfrm>
+          <a:prstGeom prst="rect">
+            <a:avLst/>
+          </a:prstGeom>
+          <a:noFill/>
+          <a:ln w="12700">
+            <a:solidFill>
+              <a:prstClr val="black"/>
+            </a:solidFill>
+          </a:ln>
+        </p:spPr>
+        <p:txBody>
+          <a:bodyPr vert="horz" lIns="91440" tIns="45720" rIns="91440" bIns="45720" rtlCol="0" anchor="ctr"/>
+          <a:lstStyle/>
+          <a:p>
+            <a:endParaRPr lang="en-US"/>
+          </a:p>
+        </p:txBody>
+      </p:sp>
+      <p:sp>
+        <p:nvSpPr>
+          <p:cNvPr id="5" name="Notes Placeholder 4"/>
+          <p:cNvSpPr>
+            <a:spLocks noGrp="1"/>
+          </p:cNvSpPr>
+          <p:nvPr>
+            <p:ph type="body" sz="quarter" idx="3"/>
+          </p:nvPr>
+        </p:nvSpPr>
+        <p:spPr>
+          <a:xfrm>
+            <a:off x="685800" y="4343400"/>
+            <a:ext cx="5486400" cy="4114800"/>
+          </a:xfrm>
+          <a:prstGeom prst="rect">
+            <a:avLst/>
+          </a:prstGeom>
+        </p:spPr>
+        <p:txBody>
+          <a:bodyPr vert="horz" lIns="91440" tIns="45720" rIns="91440" bIns="45720" rtlCol="0"/>
+          <a:lstStyle/>
+          <a:p>
+            <a:pPr lvl="0"/>
+            <a:r>
+              <a:rPr lang="en-US" smtClean="0"/>
+              <a:t>Click to edit Master text styles</a:t>
+            </a:r>
+          </a:p>
+          <a:p>
+            <a:pPr lvl="1"/>
+            <a:r>
+              <a:rPr lang="en-US" smtClean="0"/>
+              <a:t>Second level</a:t>
+            </a:r>
+          </a:p>
+          <a:p>
+            <a:pPr lvl="2"/>
+            <a:r>
+              <a:rPr lang="en-US" smtClean="0"/>
+              <a:t>Third level</a:t>
+            </a:r>
+          </a:p>
+          <a:p>
+            <a:pPr lvl="3"/>
+            <a:r>
+              <a:rPr lang="en-US" smtClean="0"/>
+              <a:t>Fourth level</a:t>
+            </a:r>
+          </a:p>
+          <a:p>
+            <a:pPr lvl="4"/>
+            <a:r>
+              <a:rPr lang="en-US" smtClean="0"/>
+              <a:t>Fifth level</a:t>
+            </a:r>
+            <a:endParaRPr lang="en-US"/>
+          </a:p>
+        </p:txBody>
+      </p:sp>
+      <p:sp>
+        <p:nvSpPr>
+          <p:cNvPr id="6" name="Footer Placeholder 5"/>
+          <p:cNvSpPr>
+            <a:spLocks noGrp="1"/>
+          </p:cNvSpPr>
+          <p:nvPr>
+            <p:ph type="ftr" sz="quarter" idx="4"/>
+          </p:nvPr>
+        </p:nvSpPr>
+        <p:spPr>
+          <a:xfrm>
+            <a:off x="0" y="8685213"/>
+            <a:ext cx="2971800" cy="457200"/>
+          </a:xfrm>
+          <a:prstGeom prst="rect">
+            <a:avLst/>
+          </a:prstGeom>
+        </p:spPr>
+        <p:txBody>
+          <a:bodyPr vert="horz" lIns="91440" tIns="45720" rIns="91440" bIns="45720" rtlCol="0" anchor="b"/>
+          <a:lstStyle>
+            <a:lvl1pPr algn="l">
+              <a:defRPr sz="1200"/>
+            </a:lvl1pPr>
+          </a:lstStyle>
+          <a:p>
+            <a:endParaRPr lang="en-US"/>
+          </a:p>
+        </p:txBody>
+      </p:sp>
+      <p:sp>
+        <p:nvSpPr>
+          <p:cNvPr id="7" name="Slide Number Placeholder 6"/>
+          <p:cNvSpPr>
+            <a:spLocks noGrp="1"/>
+          </p:cNvSpPr>
+          <p:nvPr>
+            <p:ph type="sldNum" sz="quarter" idx="5"/>
+          </p:nvPr>
+        </p:nvSpPr>
+        <p:spPr>
+          <a:xfrm>
+            <a:off x="3884613" y="8685213"/>
+            <a:ext cx="2971800" cy="457200"/>
+          </a:xfrm>
+          <a:prstGeom prst="rect">
+            <a:avLst/>
+          </a:prstGeom>
+        </p:spPr>
+        <p:txBody>
+          <a:bodyPr vert="horz" lIns="91440" tIns="45720" rIns="91440" bIns="45720" rtlCol="0" anchor="b"/>
+          <a:lstStyle>
+            <a:lvl1pPr algn="r">
+              <a:defRPr sz="1200"/>
+            </a:lvl1pPr>
+          </a:lstStyle>
+          <a:p>
+            <a:fld id="{71B3B7F8-7508-46F3-980C-B887761118C4}" type="slidenum">
+              <a:rPr lang="en-US" smtClean="0"/>
+              <a:t>‹#›</a:t>
+            </a:fld>
+            <a:endParaRPr lang="en-US"/>
+          </a:p>
+        </p:txBody>
+      </p:sp>
+    </p:spTree>
+    <p:extLst>
+      <p:ext uri="{BB962C8B-B14F-4D97-AF65-F5344CB8AC3E}">
+        <p14:creationId xmlns:p14="http://schemas.microsoft.com/office/powerpoint/2010/main" val="2605563289"/>
+      </p:ext>
+    </p:extLst>
+  </p:cSld>
+  <p:clrMap bg1="lt1" tx1="dk1" bg2="lt2" tx2="dk2" accent1="accent1" accent2="accent2" accent3="accent3" accent4="accent4" accent5="accent5" accent6="accent6" hlink="hlink" folHlink="folHlink"/>
+  <p:notesStyle>
+    <a:lvl1pPr marL="0" algn="l" defTabSz="914400" rtl="0" eaLnBrk="1" latinLnBrk="0" hangingPunct="1">
+      <a:defRPr sz="1200" kern="1200">
+        <a:solidFill>
+          <a:schemeClr val="tx1"/>
+        </a:solidFill>
+        <a:latin typeface="+mn-lt"/>
+        <a:ea typeface="+mn-ea"/>
+        <a:cs typeface="+mn-cs"/>
+      </a:defRPr>
+    </a:lvl1pPr>
+    <a:lvl2pPr marL="457200" algn="l" defTabSz="914400" rtl="0" eaLnBrk="1" latinLnBrk="0" hangingPunct="1">
+      <a:defRPr sz="1200" kern="1200">
+        <a:solidFill>
+          <a:schemeClr val="tx1"/>
+        </a:solidFill>
+        <a:latin typeface="+mn-lt"/>
+        <a:ea typeface="+mn-ea"/>
+        <a:cs typeface="+mn-cs"/>
+      </a:defRPr>
+    </a:lvl2pPr>
+    <a:lvl3pPr marL="914400" algn="l" defTabSz="914400" rtl="0" eaLnBrk="1" latinLnBrk="0" hangingPunct="1">
+      <a:defRPr sz="1200" kern="1200">
+        <a:solidFill>
+          <a:schemeClr val="tx1"/>
+        </a:solidFill>
+        <a:latin typeface="+mn-lt"/>
+        <a:ea typeface="+mn-ea"/>
+        <a:cs typeface="+mn-cs"/>
+      </a:defRPr>
+    </a:lvl3pPr>
+    <a:lvl4pPr marL="1371600" algn="l" defTabSz="914400" rtl="0" eaLnBrk="1" latinLnBrk="0" hangingPunct="1">
+      <a:defRPr sz="1200" kern="1200">
+        <a:solidFill>
+          <a:schemeClr val="tx1"/>
+        </a:solidFill>
+        <a:latin typeface="+mn-lt"/>
+        <a:ea typeface="+mn-ea"/>
+        <a:cs typeface="+mn-cs"/>
+      </a:defRPr>
+    </a:lvl4pPr>
+    <a:lvl5pPr marL="1828800" algn="l" defTabSz="914400" rtl="0" eaLnBrk="1" latinLnBrk="0" hangingPunct="1">
+      <a:defRPr sz="1200" kern="1200">
+        <a:solidFill>
+          <a:schemeClr val="tx1"/>
+        </a:solidFill>
+        <a:latin typeface="+mn-lt"/>
+        <a:ea typeface="+mn-ea"/>
+        <a:cs typeface="+mn-cs"/>
+      </a:defRPr>
+    </a:lvl5pPr>
+    <a:lvl6pPr marL="2286000" algn="l" defTabSz="914400" rtl="0" eaLnBrk="1" latinLnBrk="0" hangingPunct="1">
+      <a:defRPr sz="1200" kern="1200">
+        <a:solidFill>
+          <a:schemeClr val="tx1"/>
+        </a:solidFill>
+        <a:latin typeface="+mn-lt"/>
+        <a:ea typeface="+mn-ea"/>
+        <a:cs typeface="+mn-cs"/>
+      </a:defRPr>
+    </a:lvl6pPr>
+    <a:lvl7pPr marL="2743200" algn="l" defTabSz="914400" rtl="0" eaLnBrk="1" latinLnBrk="0" hangingPunct="1">
+      <a:defRPr sz="1200" kern="1200">
+        <a:solidFill>
+          <a:schemeClr val="tx1"/>
+        </a:solidFill>
+        <a:latin typeface="+mn-lt"/>
+        <a:ea typeface="+mn-ea"/>
+        <a:cs typeface="+mn-cs"/>
+      </a:defRPr>
+    </a:lvl7pPr>
+    <a:lvl8pPr marL="3200400" algn="l" defTabSz="914400" rtl="0" eaLnBrk="1" latinLnBrk="0" hangingPunct="1">
+      <a:defRPr sz="1200" kern="1200">
+        <a:solidFill>
+          <a:schemeClr val="tx1"/>
+        </a:solidFill>
+        <a:latin typeface="+mn-lt"/>
+        <a:ea typeface="+mn-ea"/>
+        <a:cs typeface="+mn-cs"/>
+      </a:defRPr>
+    </a:lvl8pPr>
+    <a:lvl9pPr marL="3657600" algn="l" defTabSz="914400" rtl="0" eaLnBrk="1" latinLnBrk="0" hangingPunct="1">
+      <a:defRPr sz="1200" kern="1200">
+        <a:solidFill>
+          <a:schemeClr val="tx1"/>
+        </a:solidFill>
+        <a:latin typeface="+mn-lt"/>
+        <a:ea typeface="+mn-ea"/>
+        <a:cs typeface="+mn-cs"/>
+      </a:defRPr>
+    </a:lvl9pPr>
+  </p:notesStyle>
+</p:notesMaster>
+</file>
+
+<file path=ppt/notesSlides/notesSlide1.xml><?xml version="1.0" encoding="utf-8"?>
+<p:notes xmlns:a="http://schemas.openxmlformats.org/drawingml/2006/main" xmlns:r="http://schemas.openxmlformats.org/officeDocument/2006/relationships" xmlns:p="http://schemas.openxmlformats.org/presentationml/2006/main">
+  <p:cSld>
+    <p:spTree>
+      <p:nvGrpSpPr>
+        <p:cNvPr id="1" name=""/>
+        <p:cNvGrpSpPr/>
+        <p:nvPr/>
+      </p:nvGrpSpPr>
+      <p:grpSpPr>
+        <a:xfrm>
+          <a:off x="0" y="0"/>
+          <a:ext cx="0" cy="0"/>
+          <a:chOff x="0" y="0"/>
+          <a:chExt cx="0" cy="0"/>
+        </a:xfrm>
+      </p:grpSpPr>
+      <p:sp>
+        <p:nvSpPr>
+          <p:cNvPr id="2" name="Slide Image Placeholder 1"/>
+          <p:cNvSpPr>
+            <a:spLocks noGrp="1" noRot="1" noChangeAspect="1"/>
+          </p:cNvSpPr>
+          <p:nvPr>
+            <p:ph type="sldImg"/>
+          </p:nvPr>
+        </p:nvSpPr>
+        <p:spPr>
+          <a:xfrm>
+            <a:off x="762000" y="685800"/>
+            <a:ext cx="5334000" cy="3429000"/>
+          </a:xfrm>
+        </p:spPr>
+      </p:sp>
+      <p:sp>
+        <p:nvSpPr>
+          <p:cNvPr id="3" name="Notes Placeholder 2"/>
+          <p:cNvSpPr>
+            <a:spLocks noGrp="1"/>
+          </p:cNvSpPr>
+          <p:nvPr>
+            <p:ph type="body" idx="1"/>
+          </p:nvPr>
+        </p:nvSpPr>
+        <p:spPr/>
+        <p:txBody>
+          <a:bodyPr/>
+          <a:lstStyle/>
+          <a:p>
+            <a:endParaRPr lang="en-US" dirty="0"/>
+          </a:p>
+        </p:txBody>
+      </p:sp>
+      <p:sp>
+        <p:nvSpPr>
+          <p:cNvPr id="4" name="Slide Number Placeholder 3"/>
+          <p:cNvSpPr>
+            <a:spLocks noGrp="1"/>
+          </p:cNvSpPr>
+          <p:nvPr>
+            <p:ph type="sldNum" sz="quarter" idx="10"/>
+          </p:nvPr>
+        </p:nvSpPr>
+        <p:spPr/>
+        <p:txBody>
+          <a:bodyPr/>
+          <a:lstStyle/>
+          <a:p>
+            <a:fld id="{71B3B7F8-7508-46F3-980C-B887761118C4}" type="slidenum">
+              <a:rPr lang="en-US" smtClean="0"/>
+              <a:t>1</a:t>
+            </a:fld>
+            <a:endParaRPr lang="en-US"/>
+          </a:p>
+        </p:txBody>
+      </p:sp>
+    </p:spTree>
+    <p:extLst>
+      <p:ext uri="{BB962C8B-B14F-4D97-AF65-F5344CB8AC3E}">
+        <p14:creationId xmlns:p14="http://schemas.microsoft.com/office/powerpoint/2010/main" val="4283908559"/>
+      </p:ext>
+    </p:extLst>
+  </p:cSld>
+  <p:clrMapOvr>
+    <a:masterClrMapping/>
+  </p:clrMapOvr>
+</p:notes>
 </file>
 
 <file path=ppt/slideLayouts/slideLayout1.xml><?xml version="1.0" encoding="utf-8"?>
@@ -152,8 +594,8 @@
         </p:nvSpPr>
         <p:spPr>
           <a:xfrm>
-            <a:off x="2468880" y="15907176"/>
-            <a:ext cx="27980640" cy="10976187"/>
+            <a:off x="3840480" y="10226042"/>
+            <a:ext cx="43525440" cy="7056120"/>
           </a:xfrm>
         </p:spPr>
         <p:txBody>
@@ -180,8 +622,8 @@
         </p:nvSpPr>
         <p:spPr>
           <a:xfrm>
-            <a:off x="4937760" y="29016960"/>
-            <a:ext cx="23042880" cy="13086080"/>
+            <a:off x="7680960" y="18653760"/>
+            <a:ext cx="35844480" cy="8412480"/>
           </a:xfrm>
         </p:spPr>
         <p:txBody>
@@ -304,7 +746,7 @@
           <a:p>
             <a:fld id="{EB673822-A08F-483D-ABDB-B4B1D2B76DF4}" type="datetimeFigureOut">
               <a:rPr lang="en-US" smtClean="0"/>
-              <a:t>3/12/14</a:t>
+              <a:t>4/15/2015</a:t>
             </a:fld>
             <a:endParaRPr lang="en-US"/>
           </a:p>
@@ -474,7 +916,7 @@
           <a:p>
             <a:fld id="{EB673822-A08F-483D-ABDB-B4B1D2B76DF4}" type="datetimeFigureOut">
               <a:rPr lang="en-US" smtClean="0"/>
-              <a:t>3/12/14</a:t>
+              <a:t>4/15/2015</a:t>
             </a:fld>
             <a:endParaRPr lang="en-US"/>
           </a:p>
@@ -564,8 +1006,8 @@
         </p:nvSpPr>
         <p:spPr>
           <a:xfrm>
-            <a:off x="133650990" y="9838267"/>
-            <a:ext cx="41473757" cy="209721030"/>
+            <a:off x="207901541" y="6324600"/>
+            <a:ext cx="64514733" cy="134820662"/>
           </a:xfrm>
         </p:spPr>
         <p:txBody>
@@ -592,8 +1034,8 @@
         </p:nvSpPr>
         <p:spPr>
           <a:xfrm>
-            <a:off x="9218299" y="9838267"/>
-            <a:ext cx="123884053" cy="209721030"/>
+            <a:off x="14339577" y="6324600"/>
+            <a:ext cx="192708527" cy="134820662"/>
           </a:xfrm>
         </p:spPr>
         <p:txBody>
@@ -654,7 +1096,7 @@
           <a:p>
             <a:fld id="{EB673822-A08F-483D-ABDB-B4B1D2B76DF4}" type="datetimeFigureOut">
               <a:rPr lang="en-US" smtClean="0"/>
-              <a:t>3/12/14</a:t>
+              <a:t>4/15/2015</a:t>
             </a:fld>
             <a:endParaRPr lang="en-US"/>
           </a:p>
@@ -824,7 +1266,7 @@
           <a:p>
             <a:fld id="{EB673822-A08F-483D-ABDB-B4B1D2B76DF4}" type="datetimeFigureOut">
               <a:rPr lang="en-US" smtClean="0"/>
-              <a:t>3/12/14</a:t>
+              <a:t>4/15/2015</a:t>
             </a:fld>
             <a:endParaRPr lang="en-US"/>
           </a:p>
@@ -914,8 +1356,8 @@
         </p:nvSpPr>
         <p:spPr>
           <a:xfrm>
-            <a:off x="2600327" y="32904856"/>
-            <a:ext cx="27980640" cy="10170160"/>
+            <a:off x="4044953" y="21153122"/>
+            <a:ext cx="43525440" cy="6537960"/>
           </a:xfrm>
         </p:spPr>
         <p:txBody>
@@ -946,8 +1388,8 @@
         </p:nvSpPr>
         <p:spPr>
           <a:xfrm>
-            <a:off x="2600327" y="21703461"/>
-            <a:ext cx="27980640" cy="11201397"/>
+            <a:off x="4044953" y="13952225"/>
+            <a:ext cx="43525440" cy="7200898"/>
           </a:xfrm>
         </p:spPr>
         <p:txBody>
@@ -1070,7 +1512,7 @@
           <a:p>
             <a:fld id="{EB673822-A08F-483D-ABDB-B4B1D2B76DF4}" type="datetimeFigureOut">
               <a:rPr lang="en-US" smtClean="0"/>
-              <a:t>3/12/14</a:t>
+              <a:t>4/15/2015</a:t>
             </a:fld>
             <a:endParaRPr lang="en-US"/>
           </a:p>
@@ -1183,8 +1625,8 @@
         </p:nvSpPr>
         <p:spPr>
           <a:xfrm>
-            <a:off x="9218297" y="57346427"/>
-            <a:ext cx="82678903" cy="162212870"/>
+            <a:off x="14339574" y="36865560"/>
+            <a:ext cx="128611627" cy="104279702"/>
           </a:xfrm>
         </p:spPr>
         <p:txBody>
@@ -1268,8 +1710,8 @@
         </p:nvSpPr>
         <p:spPr>
           <a:xfrm>
-            <a:off x="92445842" y="57346427"/>
-            <a:ext cx="82678907" cy="162212870"/>
+            <a:off x="143804644" y="36865560"/>
+            <a:ext cx="128611633" cy="104279702"/>
           </a:xfrm>
         </p:spPr>
         <p:txBody>
@@ -1358,7 +1800,7 @@
           <a:p>
             <a:fld id="{EB673822-A08F-483D-ABDB-B4B1D2B76DF4}" type="datetimeFigureOut">
               <a:rPr lang="en-US" smtClean="0"/>
-              <a:t>3/12/14</a:t>
+              <a:t>4/15/2015</a:t>
             </a:fld>
             <a:endParaRPr lang="en-US"/>
           </a:p>
@@ -1448,8 +1890,8 @@
         </p:nvSpPr>
         <p:spPr>
           <a:xfrm>
-            <a:off x="1645920" y="2050630"/>
-            <a:ext cx="29626560" cy="8534400"/>
+            <a:off x="2560320" y="1318262"/>
+            <a:ext cx="46085760" cy="5486400"/>
           </a:xfrm>
         </p:spPr>
         <p:txBody>
@@ -1480,8 +1922,8 @@
         </p:nvSpPr>
         <p:spPr>
           <a:xfrm>
-            <a:off x="1645920" y="11462177"/>
-            <a:ext cx="14544677" cy="4776890"/>
+            <a:off x="2560321" y="7368542"/>
+            <a:ext cx="22625053" cy="3070858"/>
           </a:xfrm>
         </p:spPr>
         <p:txBody>
@@ -1545,8 +1987,8 @@
         </p:nvSpPr>
         <p:spPr>
           <a:xfrm>
-            <a:off x="1645920" y="16239067"/>
-            <a:ext cx="14544677" cy="29502950"/>
+            <a:off x="2560321" y="10439400"/>
+            <a:ext cx="22625053" cy="18966182"/>
           </a:xfrm>
         </p:spPr>
         <p:txBody>
@@ -1630,8 +2072,8 @@
         </p:nvSpPr>
         <p:spPr>
           <a:xfrm>
-            <a:off x="16722092" y="11462177"/>
-            <a:ext cx="14550390" cy="4776890"/>
+            <a:off x="26012143" y="7368542"/>
+            <a:ext cx="22633940" cy="3070858"/>
           </a:xfrm>
         </p:spPr>
         <p:txBody>
@@ -1695,8 +2137,8 @@
         </p:nvSpPr>
         <p:spPr>
           <a:xfrm>
-            <a:off x="16722092" y="16239067"/>
-            <a:ext cx="14550390" cy="29502950"/>
+            <a:off x="26012143" y="10439400"/>
+            <a:ext cx="22633940" cy="18966182"/>
           </a:xfrm>
         </p:spPr>
         <p:txBody>
@@ -1785,7 +2227,7 @@
           <a:p>
             <a:fld id="{EB673822-A08F-483D-ABDB-B4B1D2B76DF4}" type="datetimeFigureOut">
               <a:rPr lang="en-US" smtClean="0"/>
-              <a:t>3/12/14</a:t>
+              <a:t>4/15/2015</a:t>
             </a:fld>
             <a:endParaRPr lang="en-US"/>
           </a:p>
@@ -1903,7 +2345,7 @@
           <a:p>
             <a:fld id="{EB673822-A08F-483D-ABDB-B4B1D2B76DF4}" type="datetimeFigureOut">
               <a:rPr lang="en-US" smtClean="0"/>
-              <a:t>3/12/14</a:t>
+              <a:t>4/15/2015</a:t>
             </a:fld>
             <a:endParaRPr lang="en-US"/>
           </a:p>
@@ -1998,7 +2440,7 @@
           <a:p>
             <a:fld id="{EB673822-A08F-483D-ABDB-B4B1D2B76DF4}" type="datetimeFigureOut">
               <a:rPr lang="en-US" smtClean="0"/>
-              <a:t>3/12/14</a:t>
+              <a:t>4/15/2015</a:t>
             </a:fld>
             <a:endParaRPr lang="en-US"/>
           </a:p>
@@ -2088,8 +2530,8 @@
         </p:nvSpPr>
         <p:spPr>
           <a:xfrm>
-            <a:off x="1645922" y="2038773"/>
-            <a:ext cx="10829927" cy="8676640"/>
+            <a:off x="2560324" y="1310640"/>
+            <a:ext cx="16846553" cy="5577840"/>
           </a:xfrm>
         </p:spPr>
         <p:txBody>
@@ -2120,8 +2562,8 @@
         </p:nvSpPr>
         <p:spPr>
           <a:xfrm>
-            <a:off x="12870180" y="2038778"/>
-            <a:ext cx="18402300" cy="43703243"/>
+            <a:off x="20020280" y="1310643"/>
+            <a:ext cx="28625800" cy="28094942"/>
           </a:xfrm>
         </p:spPr>
         <p:txBody>
@@ -2205,8 +2647,8 @@
         </p:nvSpPr>
         <p:spPr>
           <a:xfrm>
-            <a:off x="1645922" y="10715418"/>
-            <a:ext cx="10829927" cy="35026603"/>
+            <a:off x="2560324" y="6888483"/>
+            <a:ext cx="16846553" cy="22517102"/>
           </a:xfrm>
         </p:spPr>
         <p:txBody>
@@ -2275,7 +2717,7 @@
           <a:p>
             <a:fld id="{EB673822-A08F-483D-ABDB-B4B1D2B76DF4}" type="datetimeFigureOut">
               <a:rPr lang="en-US" smtClean="0"/>
-              <a:t>3/12/14</a:t>
+              <a:t>4/15/2015</a:t>
             </a:fld>
             <a:endParaRPr lang="en-US"/>
           </a:p>
@@ -2365,8 +2807,8 @@
         </p:nvSpPr>
         <p:spPr>
           <a:xfrm>
-            <a:off x="6452237" y="35844480"/>
-            <a:ext cx="19751040" cy="4231643"/>
+            <a:off x="10036813" y="23042880"/>
+            <a:ext cx="30723840" cy="2720342"/>
           </a:xfrm>
         </p:spPr>
         <p:txBody>
@@ -2397,8 +2839,8 @@
         </p:nvSpPr>
         <p:spPr>
           <a:xfrm>
-            <a:off x="6452237" y="4575387"/>
-            <a:ext cx="19751040" cy="30723840"/>
+            <a:off x="10036813" y="2941320"/>
+            <a:ext cx="30723840" cy="19751040"/>
           </a:xfrm>
         </p:spPr>
         <p:txBody>
@@ -2458,8 +2900,8 @@
         </p:nvSpPr>
         <p:spPr>
           <a:xfrm>
-            <a:off x="6452237" y="40076123"/>
-            <a:ext cx="19751040" cy="6009637"/>
+            <a:off x="10036813" y="25763222"/>
+            <a:ext cx="30723840" cy="3863338"/>
           </a:xfrm>
         </p:spPr>
         <p:txBody>
@@ -2528,7 +2970,7 @@
           <a:p>
             <a:fld id="{EB673822-A08F-483D-ABDB-B4B1D2B76DF4}" type="datetimeFigureOut">
               <a:rPr lang="en-US" smtClean="0"/>
-              <a:t>3/12/14</a:t>
+              <a:t>4/15/2015</a:t>
             </a:fld>
             <a:endParaRPr lang="en-US"/>
           </a:p>
@@ -2623,8 +3065,8 @@
         </p:nvSpPr>
         <p:spPr>
           <a:xfrm>
-            <a:off x="1645920" y="2050630"/>
-            <a:ext cx="29626560" cy="8534400"/>
+            <a:off x="2560320" y="1318262"/>
+            <a:ext cx="46085760" cy="5486400"/>
           </a:xfrm>
           <a:prstGeom prst="rect">
             <a:avLst/>
@@ -2656,8 +3098,8 @@
         </p:nvSpPr>
         <p:spPr>
           <a:xfrm>
-            <a:off x="1645920" y="11948165"/>
-            <a:ext cx="29626560" cy="33793856"/>
+            <a:off x="2560320" y="7680963"/>
+            <a:ext cx="46085760" cy="21724622"/>
           </a:xfrm>
           <a:prstGeom prst="rect">
             <a:avLst/>
@@ -2718,8 +3160,8 @@
         </p:nvSpPr>
         <p:spPr>
           <a:xfrm>
-            <a:off x="1645920" y="47460750"/>
-            <a:ext cx="7680960" cy="2726267"/>
+            <a:off x="2560320" y="30510483"/>
+            <a:ext cx="11948160" cy="1752600"/>
           </a:xfrm>
           <a:prstGeom prst="rect">
             <a:avLst/>
@@ -2741,7 +3183,7 @@
           <a:p>
             <a:fld id="{EB673822-A08F-483D-ABDB-B4B1D2B76DF4}" type="datetimeFigureOut">
               <a:rPr lang="en-US" smtClean="0"/>
-              <a:t>3/12/14</a:t>
+              <a:t>4/15/2015</a:t>
             </a:fld>
             <a:endParaRPr lang="en-US"/>
           </a:p>
@@ -2759,8 +3201,8 @@
         </p:nvSpPr>
         <p:spPr>
           <a:xfrm>
-            <a:off x="11247120" y="47460750"/>
-            <a:ext cx="10424160" cy="2726267"/>
+            <a:off x="17495520" y="30510483"/>
+            <a:ext cx="16215360" cy="1752600"/>
           </a:xfrm>
           <a:prstGeom prst="rect">
             <a:avLst/>
@@ -2796,8 +3238,8 @@
         </p:nvSpPr>
         <p:spPr>
           <a:xfrm>
-            <a:off x="23591520" y="47460750"/>
-            <a:ext cx="7680960" cy="2726267"/>
+            <a:off x="36697920" y="30510483"/>
+            <a:ext cx="11948160" cy="1752600"/>
           </a:xfrm>
           <a:prstGeom prst="rect">
             <a:avLst/>
@@ -3124,8 +3566,8 @@
         </p:nvSpPr>
         <p:spPr>
           <a:xfrm>
-            <a:off x="0" y="5497286"/>
-            <a:ext cx="32918400" cy="293914"/>
+            <a:off x="457200" y="6019800"/>
+            <a:ext cx="51206400" cy="188945"/>
           </a:xfrm>
           <a:prstGeom prst="rect">
             <a:avLst/>
@@ -3162,60 +3604,6 @@
           </a:p>
         </p:txBody>
       </p:sp>
-      <p:sp>
-        <p:nvSpPr>
-          <p:cNvPr id="6" name="TextBox 5"/>
-          <p:cNvSpPr txBox="1"/>
-          <p:nvPr/>
-        </p:nvSpPr>
-        <p:spPr>
-          <a:xfrm>
-            <a:off x="10820400" y="1448150"/>
-            <a:ext cx="6965029" cy="1032282"/>
-          </a:xfrm>
-          <a:prstGeom prst="rect">
-            <a:avLst/>
-          </a:prstGeom>
-          <a:noFill/>
-        </p:spPr>
-        <p:txBody>
-          <a:bodyPr wrap="none" rtlCol="0">
-            <a:spAutoFit/>
-          </a:bodyPr>
-          <a:lstStyle/>
-          <a:p>
-            <a:r>
-              <a:rPr lang="en-US" sz="6108" dirty="0"/>
-              <a:t>This slide </a:t>
-            </a:r>
-            <a:r>
-              <a:rPr lang="en-US" sz="6108"/>
-              <a:t>is </a:t>
-            </a:r>
-            <a:r>
-              <a:rPr lang="en-US" sz="6108" dirty="0"/>
-              <a:t>3</a:t>
-            </a:r>
-            <a:r>
-              <a:rPr lang="en-US" sz="6108" smtClean="0"/>
-              <a:t>6</a:t>
-            </a:r>
-            <a:r>
-              <a:rPr lang="en-US" sz="6108" dirty="0" smtClean="0"/>
-              <a:t>˝ </a:t>
-            </a:r>
-            <a:r>
-              <a:rPr lang="en-US" sz="6108"/>
-              <a:t>x 5</a:t>
-            </a:r>
-            <a:r>
-              <a:rPr lang="en-US" sz="6108" smtClean="0"/>
-              <a:t>6˝</a:t>
-            </a:r>
-            <a:endParaRPr lang="en-US" sz="6108" dirty="0"/>
-          </a:p>
-        </p:txBody>
-      </p:sp>
       <p:pic>
         <p:nvPicPr>
           <p:cNvPr id="2" name="Picture 1" descr="HMC BGW CMYK 4inch.jpg"/>
@@ -3225,7 +3613,7 @@
           <p:nvPr/>
         </p:nvPicPr>
         <p:blipFill>
-          <a:blip r:embed="rId2" cstate="print">
+          <a:blip r:embed="rId4" cstate="print">
             <a:extLst>
               <a:ext uri="{28A0092B-C50C-407E-A947-70E740481C1C}">
                 <a14:useLocalDpi xmlns:a14="http://schemas.microsoft.com/office/drawing/2010/main" val="0"/>
@@ -3238,7 +3626,7 @@
         </p:blipFill>
         <p:spPr>
           <a:xfrm>
-            <a:off x="20955000" y="838200"/>
+            <a:off x="1295400" y="1007380"/>
             <a:ext cx="3657600" cy="3657600"/>
           </a:xfrm>
           <a:prstGeom prst="rect">
@@ -3255,7 +3643,7 @@
           <p:nvPr/>
         </p:nvPicPr>
         <p:blipFill>
-          <a:blip r:embed="rId3">
+          <a:blip r:embed="rId5" cstate="print">
             <a:extLst>
               <a:ext uri="{28A0092B-C50C-407E-A947-70E740481C1C}">
                 <a14:useLocalDpi xmlns:a14="http://schemas.microsoft.com/office/drawing/2010/main" val="0"/>
@@ -3268,7 +3656,7 @@
         </p:blipFill>
         <p:spPr>
           <a:xfrm>
-            <a:off x="28346400" y="838200"/>
+            <a:off x="46405800" y="930954"/>
             <a:ext cx="3657600" cy="3657600"/>
           </a:xfrm>
           <a:prstGeom prst="rect">
@@ -3278,14 +3666,14 @@
       </p:pic>
       <p:sp>
         <p:nvSpPr>
-          <p:cNvPr id="7" name="TextBox 6"/>
+          <p:cNvPr id="4" name="TextBox 3"/>
           <p:cNvSpPr txBox="1"/>
           <p:nvPr/>
         </p:nvSpPr>
         <p:spPr>
           <a:xfrm>
-            <a:off x="25799147" y="1676400"/>
-            <a:ext cx="1251853" cy="1554272"/>
+            <a:off x="14897100" y="930954"/>
+            <a:ext cx="22326600" cy="3016210"/>
           </a:xfrm>
           <a:prstGeom prst="rect">
             <a:avLst/>
@@ -3293,16 +3681,349 @@
           <a:noFill/>
         </p:spPr>
         <p:txBody>
-          <a:bodyPr wrap="none" rtlCol="0">
+          <a:bodyPr wrap="square" rtlCol="0">
             <a:spAutoFit/>
           </a:bodyPr>
           <a:lstStyle/>
           <a:p>
+            <a:pPr algn="ctr"/>
             <a:r>
               <a:rPr lang="en-US" dirty="0" smtClean="0"/>
-              <a:t>or</a:t>
+              <a:t>Optical Networks for Controlling Quantum Communication Systems</a:t>
             </a:r>
             <a:endParaRPr lang="en-US" dirty="0"/>
+          </a:p>
+        </p:txBody>
+      </p:sp>
+      <p:sp>
+        <p:nvSpPr>
+          <p:cNvPr id="8" name="TextBox 7"/>
+          <p:cNvSpPr txBox="1"/>
+          <p:nvPr/>
+        </p:nvSpPr>
+        <p:spPr>
+          <a:xfrm>
+            <a:off x="16154400" y="3695484"/>
+            <a:ext cx="19812000" cy="1938992"/>
+          </a:xfrm>
+          <a:prstGeom prst="rect">
+            <a:avLst/>
+          </a:prstGeom>
+          <a:noFill/>
+        </p:spPr>
+        <p:txBody>
+          <a:bodyPr wrap="square" rtlCol="0">
+            <a:spAutoFit/>
+          </a:bodyPr>
+          <a:lstStyle/>
+          <a:p>
+            <a:pPr algn="ctr"/>
+            <a:r>
+              <a:rPr lang="en-US" sz="6000" dirty="0" smtClean="0"/>
+              <a:t>Paul Jerger, Alexander Kendrick, </a:t>
+            </a:r>
+            <a:r>
+              <a:rPr lang="en-US" sz="6000" dirty="0" err="1" smtClean="0"/>
+              <a:t>Kunal</a:t>
+            </a:r>
+            <a:r>
+              <a:rPr lang="en-US" sz="6000" dirty="0" smtClean="0"/>
+              <a:t> </a:t>
+            </a:r>
+            <a:r>
+              <a:rPr lang="en-US" sz="6000" dirty="0" err="1" smtClean="0"/>
+              <a:t>Menda</a:t>
+            </a:r>
+            <a:r>
+              <a:rPr lang="en-US" sz="6000" dirty="0" smtClean="0"/>
+              <a:t>, </a:t>
+            </a:r>
+            <a:r>
+              <a:rPr lang="en-US" sz="6000" dirty="0" err="1" smtClean="0"/>
+              <a:t>Nithya</a:t>
+            </a:r>
+            <a:r>
+              <a:rPr lang="en-US" sz="6000" dirty="0" smtClean="0"/>
+              <a:t> Menon, Fernando Ortega, and Luke St. Marie</a:t>
+            </a:r>
+            <a:endParaRPr lang="en-US" sz="6000" dirty="0"/>
+          </a:p>
+        </p:txBody>
+      </p:sp>
+      <p:pic>
+        <p:nvPicPr>
+          <p:cNvPr id="9" name="Picture 8"/>
+          <p:cNvPicPr>
+            <a:picLocks noChangeAspect="1"/>
+          </p:cNvPicPr>
+          <p:nvPr/>
+        </p:nvPicPr>
+        <p:blipFill>
+          <a:blip r:embed="rId6" cstate="print">
+            <a:extLst>
+              <a:ext uri="{28A0092B-C50C-407E-A947-70E740481C1C}">
+                <a14:useLocalDpi xmlns:a14="http://schemas.microsoft.com/office/drawing/2010/main" val="0"/>
+              </a:ext>
+            </a:extLst>
+          </a:blip>
+          <a:stretch>
+            <a:fillRect/>
+          </a:stretch>
+        </p:blipFill>
+        <p:spPr>
+          <a:xfrm>
+            <a:off x="41376600" y="2261617"/>
+            <a:ext cx="2730551" cy="1685547"/>
+          </a:xfrm>
+          <a:prstGeom prst="rect">
+            <a:avLst/>
+          </a:prstGeom>
+        </p:spPr>
+      </p:pic>
+      <p:graphicFrame>
+        <p:nvGraphicFramePr>
+          <p:cNvPr id="11" name="Object 10"/>
+          <p:cNvGraphicFramePr>
+            <a:graphicFrameLocks noChangeAspect="1"/>
+          </p:cNvGraphicFramePr>
+          <p:nvPr>
+            <p:extLst>
+              <p:ext uri="{D42A27DB-BD31-4B8C-83A1-F6EECF244321}">
+                <p14:modId xmlns:p14="http://schemas.microsoft.com/office/powerpoint/2010/main" val="729116582"/>
+              </p:ext>
+            </p:extLst>
+          </p:nvPr>
+        </p:nvGraphicFramePr>
+        <p:xfrm>
+          <a:off x="42405300" y="8707248"/>
+          <a:ext cx="5829300" cy="7543800"/>
+        </p:xfrm>
+        <a:graphic>
+          <a:graphicData uri="http://schemas.openxmlformats.org/presentationml/2006/ole">
+            <mc:AlternateContent xmlns:mc="http://schemas.openxmlformats.org/markup-compatibility/2006">
+              <mc:Choice xmlns:v="urn:schemas-microsoft-com:vml" Requires="v">
+                <p:oleObj spid="_x0000_s1027" name="Acrobat Document" r:id="rId7" imgW="5829199" imgH="7543800" progId="AcroExch.Document.11">
+                  <p:embed/>
+                </p:oleObj>
+              </mc:Choice>
+              <mc:Fallback>
+                <p:oleObj name="Acrobat Document" r:id="rId7" imgW="5829199" imgH="7543800" progId="AcroExch.Document.11">
+                  <p:embed/>
+                  <p:pic>
+                    <p:nvPicPr>
+                      <p:cNvPr id="0" name=""/>
+                      <p:cNvPicPr/>
+                      <p:nvPr/>
+                    </p:nvPicPr>
+                    <p:blipFill>
+                      <a:blip r:embed="rId8"/>
+                      <a:stretch>
+                        <a:fillRect/>
+                      </a:stretch>
+                    </p:blipFill>
+                    <p:spPr>
+                      <a:xfrm>
+                        <a:off x="42405300" y="8707248"/>
+                        <a:ext cx="5829300" cy="7543800"/>
+                      </a:xfrm>
+                      <a:prstGeom prst="rect">
+                        <a:avLst/>
+                      </a:prstGeom>
+                    </p:spPr>
+                  </p:pic>
+                </p:oleObj>
+              </mc:Fallback>
+            </mc:AlternateContent>
+          </a:graphicData>
+        </a:graphic>
+      </p:graphicFrame>
+      <p:sp>
+        <p:nvSpPr>
+          <p:cNvPr id="12" name="TextBox 11"/>
+          <p:cNvSpPr txBox="1"/>
+          <p:nvPr/>
+        </p:nvSpPr>
+        <p:spPr>
+          <a:xfrm>
+            <a:off x="2296886" y="8000999"/>
+            <a:ext cx="13868400" cy="4478149"/>
+          </a:xfrm>
+          <a:prstGeom prst="rect">
+            <a:avLst/>
+          </a:prstGeom>
+          <a:noFill/>
+        </p:spPr>
+        <p:txBody>
+          <a:bodyPr wrap="square" rtlCol="0">
+            <a:spAutoFit/>
+          </a:bodyPr>
+          <a:lstStyle/>
+          <a:p>
+            <a:r>
+              <a:rPr lang="en-US" dirty="0" smtClean="0"/>
+              <a:t>This is 95-point font. It is the same as the title of the slide.</a:t>
+            </a:r>
+            <a:endParaRPr lang="en-US" dirty="0"/>
+          </a:p>
+        </p:txBody>
+      </p:sp>
+      <p:sp>
+        <p:nvSpPr>
+          <p:cNvPr id="13" name="TextBox 12"/>
+          <p:cNvSpPr txBox="1"/>
+          <p:nvPr/>
+        </p:nvSpPr>
+        <p:spPr>
+          <a:xfrm>
+            <a:off x="2296886" y="14630400"/>
+            <a:ext cx="13868400" cy="2554545"/>
+          </a:xfrm>
+          <a:prstGeom prst="rect">
+            <a:avLst/>
+          </a:prstGeom>
+          <a:noFill/>
+        </p:spPr>
+        <p:txBody>
+          <a:bodyPr wrap="square" rtlCol="0">
+            <a:spAutoFit/>
+          </a:bodyPr>
+          <a:lstStyle/>
+          <a:p>
+            <a:r>
+              <a:rPr lang="en-US" sz="8000" dirty="0" smtClean="0"/>
+              <a:t>This is 80-point font. Sample text for comparison.</a:t>
+            </a:r>
+            <a:endParaRPr lang="en-US" sz="8000" dirty="0"/>
+          </a:p>
+        </p:txBody>
+      </p:sp>
+      <p:sp>
+        <p:nvSpPr>
+          <p:cNvPr id="14" name="TextBox 13"/>
+          <p:cNvSpPr txBox="1"/>
+          <p:nvPr/>
+        </p:nvSpPr>
+        <p:spPr>
+          <a:xfrm>
+            <a:off x="2296886" y="19202400"/>
+            <a:ext cx="13857514" cy="2308324"/>
+          </a:xfrm>
+          <a:prstGeom prst="rect">
+            <a:avLst/>
+          </a:prstGeom>
+          <a:noFill/>
+        </p:spPr>
+        <p:txBody>
+          <a:bodyPr wrap="square" rtlCol="0">
+            <a:spAutoFit/>
+          </a:bodyPr>
+          <a:lstStyle/>
+          <a:p>
+            <a:r>
+              <a:rPr lang="en-US" sz="7200" dirty="0" smtClean="0"/>
+              <a:t>This is 72-point font. Sample text for comparison.</a:t>
+            </a:r>
+            <a:endParaRPr lang="en-US" sz="7200" dirty="0"/>
+          </a:p>
+        </p:txBody>
+      </p:sp>
+      <p:sp>
+        <p:nvSpPr>
+          <p:cNvPr id="15" name="TextBox 14"/>
+          <p:cNvSpPr txBox="1"/>
+          <p:nvPr/>
+        </p:nvSpPr>
+        <p:spPr>
+          <a:xfrm>
+            <a:off x="2296886" y="23894810"/>
+            <a:ext cx="13868400" cy="4708981"/>
+          </a:xfrm>
+          <a:prstGeom prst="rect">
+            <a:avLst/>
+          </a:prstGeom>
+          <a:noFill/>
+        </p:spPr>
+        <p:txBody>
+          <a:bodyPr wrap="square" rtlCol="0">
+            <a:spAutoFit/>
+          </a:bodyPr>
+          <a:lstStyle/>
+          <a:p>
+            <a:r>
+              <a:rPr lang="en-US" sz="6000" dirty="0" smtClean="0"/>
+              <a:t>This is 60-point font. It is the same size as the names under the title. We may use this for the body of the text, so here is a lengthier sample so we can see how it looks as a paragraph.</a:t>
+            </a:r>
+            <a:endParaRPr lang="en-US" sz="6000" dirty="0"/>
+          </a:p>
+        </p:txBody>
+      </p:sp>
+      <p:sp>
+        <p:nvSpPr>
+          <p:cNvPr id="16" name="TextBox 15"/>
+          <p:cNvSpPr txBox="1"/>
+          <p:nvPr/>
+        </p:nvSpPr>
+        <p:spPr>
+          <a:xfrm>
+            <a:off x="33811029" y="17184945"/>
+            <a:ext cx="13868400" cy="3046988"/>
+          </a:xfrm>
+          <a:prstGeom prst="rect">
+            <a:avLst/>
+          </a:prstGeom>
+          <a:noFill/>
+        </p:spPr>
+        <p:txBody>
+          <a:bodyPr wrap="square" rtlCol="0">
+            <a:spAutoFit/>
+          </a:bodyPr>
+          <a:lstStyle/>
+          <a:p>
+            <a:r>
+              <a:rPr lang="en-US" sz="4800" dirty="0" smtClean="0"/>
+              <a:t>This is 48-point font. We may use this for the body of the text, so here is some lengthier text.  This text should be easily readable in paragraph form, but small enough that we can include all the text that we want.</a:t>
+            </a:r>
+            <a:endParaRPr lang="en-US" sz="4800" dirty="0"/>
+          </a:p>
+        </p:txBody>
+      </p:sp>
+      <p:sp>
+        <p:nvSpPr>
+          <p:cNvPr id="17" name="TextBox 16"/>
+          <p:cNvSpPr txBox="1"/>
+          <p:nvPr/>
+        </p:nvSpPr>
+        <p:spPr>
+          <a:xfrm>
+            <a:off x="34366200" y="26295467"/>
+            <a:ext cx="13868400" cy="2308324"/>
+          </a:xfrm>
+          <a:prstGeom prst="rect">
+            <a:avLst/>
+          </a:prstGeom>
+          <a:noFill/>
+        </p:spPr>
+        <p:txBody>
+          <a:bodyPr wrap="square" rtlCol="0">
+            <a:spAutoFit/>
+          </a:bodyPr>
+          <a:lstStyle/>
+          <a:p>
+            <a:r>
+              <a:rPr lang="en-US" sz="3600" dirty="0"/>
+              <a:t>This is </a:t>
+            </a:r>
+            <a:r>
+              <a:rPr lang="en-US" sz="3600" dirty="0" smtClean="0"/>
+              <a:t>36-point </a:t>
+            </a:r>
+            <a:r>
+              <a:rPr lang="en-US" sz="3600" dirty="0"/>
+              <a:t>font. We may use this for the body of the text, so here is some lengthier text.  This text should be easily readable in paragraph form, but small enough that we can include all the text that we want.</a:t>
+            </a:r>
+          </a:p>
+          <a:p>
+            <a:endParaRPr lang="en-US" sz="3600" dirty="0"/>
           </a:p>
         </p:txBody>
       </p:sp>
@@ -3602,4 +4323,289 @@
   <a:objectDefaults/>
   <a:extraClrSchemeLst/>
 </a:theme>
+</file>
+
+<file path=ppt/theme/theme2.xml><?xml version="1.0" encoding="utf-8"?>
+<a:theme xmlns:a="http://schemas.openxmlformats.org/drawingml/2006/main" name="Office Theme">
+  <a:themeElements>
+    <a:clrScheme name="Office">
+      <a:dk1>
+        <a:sysClr val="windowText" lastClr="000000"/>
+      </a:dk1>
+      <a:lt1>
+        <a:sysClr val="window" lastClr="FFFFFF"/>
+      </a:lt1>
+      <a:dk2>
+        <a:srgbClr val="1F497D"/>
+      </a:dk2>
+      <a:lt2>
+        <a:srgbClr val="EEECE1"/>
+      </a:lt2>
+      <a:accent1>
+        <a:srgbClr val="4F81BD"/>
+      </a:accent1>
+      <a:accent2>
+        <a:srgbClr val="C0504D"/>
+      </a:accent2>
+      <a:accent3>
+        <a:srgbClr val="9BBB59"/>
+      </a:accent3>
+      <a:accent4>
+        <a:srgbClr val="8064A2"/>
+      </a:accent4>
+      <a:accent5>
+        <a:srgbClr val="4BACC6"/>
+      </a:accent5>
+      <a:accent6>
+        <a:srgbClr val="F79646"/>
+      </a:accent6>
+      <a:hlink>
+        <a:srgbClr val="0000FF"/>
+      </a:hlink>
+      <a:folHlink>
+        <a:srgbClr val="800080"/>
+      </a:folHlink>
+    </a:clrScheme>
+    <a:fontScheme name="Office">
+      <a:majorFont>
+        <a:latin typeface="Calibri"/>
+        <a:ea typeface=""/>
+        <a:cs typeface=""/>
+        <a:font script="Jpan" typeface="ＭＳ Ｐゴシック"/>
+        <a:font script="Hang" typeface="맑은 고딕"/>
+        <a:font script="Hans" typeface="宋体"/>
+        <a:font script="Hant" typeface="新細明體"/>
+        <a:font script="Arab" typeface="Times New Roman"/>
+        <a:font script="Hebr" typeface="Times New Roman"/>
+        <a:font script="Thai" typeface="Angsana New"/>
+        <a:font script="Ethi" typeface="Nyala"/>
+        <a:font script="Beng" typeface="Vrinda"/>
+        <a:font script="Gujr" typeface="Shruti"/>
+        <a:font script="Khmr" typeface="MoolBoran"/>
+        <a:font script="Knda" typeface="Tunga"/>
+        <a:font script="Guru" typeface="Raavi"/>
+        <a:font script="Cans" typeface="Euphemia"/>
+        <a:font script="Cher" typeface="Plantagenet Cherokee"/>
+        <a:font script="Yiii" typeface="Microsoft Yi Baiti"/>
+        <a:font script="Tibt" typeface="Microsoft Himalaya"/>
+        <a:font script="Thaa" typeface="MV Boli"/>
+        <a:font script="Deva" typeface="Mangal"/>
+        <a:font script="Telu" typeface="Gautami"/>
+        <a:font script="Taml" typeface="Latha"/>
+        <a:font script="Syrc" typeface="Estrangelo Edessa"/>
+        <a:font script="Orya" typeface="Kalinga"/>
+        <a:font script="Mlym" typeface="Kartika"/>
+        <a:font script="Laoo" typeface="DokChampa"/>
+        <a:font script="Sinh" typeface="Iskoola Pota"/>
+        <a:font script="Mong" typeface="Mongolian Baiti"/>
+        <a:font script="Viet" typeface="Times New Roman"/>
+        <a:font script="Uigh" typeface="Microsoft Uighur"/>
+        <a:font script="Geor" typeface="Sylfaen"/>
+      </a:majorFont>
+      <a:minorFont>
+        <a:latin typeface="Calibri"/>
+        <a:ea typeface=""/>
+        <a:cs typeface=""/>
+        <a:font script="Jpan" typeface="ＭＳ Ｐゴシック"/>
+        <a:font script="Hang" typeface="맑은 고딕"/>
+        <a:font script="Hans" typeface="宋体"/>
+        <a:font script="Hant" typeface="新細明體"/>
+        <a:font script="Arab" typeface="Arial"/>
+        <a:font script="Hebr" typeface="Arial"/>
+        <a:font script="Thai" typeface="Cordia New"/>
+        <a:font script="Ethi" typeface="Nyala"/>
+        <a:font script="Beng" typeface="Vrinda"/>
+        <a:font script="Gujr" typeface="Shruti"/>
+        <a:font script="Khmr" typeface="DaunPenh"/>
+        <a:font script="Knda" typeface="Tunga"/>
+        <a:font script="Guru" typeface="Raavi"/>
+        <a:font script="Cans" typeface="Euphemia"/>
+        <a:font script="Cher" typeface="Plantagenet Cherokee"/>
+        <a:font script="Yiii" typeface="Microsoft Yi Baiti"/>
+        <a:font script="Tibt" typeface="Microsoft Himalaya"/>
+        <a:font script="Thaa" typeface="MV Boli"/>
+        <a:font script="Deva" typeface="Mangal"/>
+        <a:font script="Telu" typeface="Gautami"/>
+        <a:font script="Taml" typeface="Latha"/>
+        <a:font script="Syrc" typeface="Estrangelo Edessa"/>
+        <a:font script="Orya" typeface="Kalinga"/>
+        <a:font script="Mlym" typeface="Kartika"/>
+        <a:font script="Laoo" typeface="DokChampa"/>
+        <a:font script="Sinh" typeface="Iskoola Pota"/>
+        <a:font script="Mong" typeface="Mongolian Baiti"/>
+        <a:font script="Viet" typeface="Arial"/>
+        <a:font script="Uigh" typeface="Microsoft Uighur"/>
+        <a:font script="Geor" typeface="Sylfaen"/>
+      </a:minorFont>
+    </a:fontScheme>
+    <a:fmtScheme name="Office">
+      <a:fillStyleLst>
+        <a:solidFill>
+          <a:schemeClr val="phClr"/>
+        </a:solidFill>
+        <a:gradFill rotWithShape="1">
+          <a:gsLst>
+            <a:gs pos="0">
+              <a:schemeClr val="phClr">
+                <a:tint val="50000"/>
+                <a:satMod val="300000"/>
+              </a:schemeClr>
+            </a:gs>
+            <a:gs pos="35000">
+              <a:schemeClr val="phClr">
+                <a:tint val="37000"/>
+                <a:satMod val="300000"/>
+              </a:schemeClr>
+            </a:gs>
+            <a:gs pos="100000">
+              <a:schemeClr val="phClr">
+                <a:tint val="15000"/>
+                <a:satMod val="350000"/>
+              </a:schemeClr>
+            </a:gs>
+          </a:gsLst>
+          <a:lin ang="16200000" scaled="1"/>
+        </a:gradFill>
+        <a:gradFill rotWithShape="1">
+          <a:gsLst>
+            <a:gs pos="0">
+              <a:schemeClr val="phClr">
+                <a:shade val="51000"/>
+                <a:satMod val="130000"/>
+              </a:schemeClr>
+            </a:gs>
+            <a:gs pos="80000">
+              <a:schemeClr val="phClr">
+                <a:shade val="93000"/>
+                <a:satMod val="130000"/>
+              </a:schemeClr>
+            </a:gs>
+            <a:gs pos="100000">
+              <a:schemeClr val="phClr">
+                <a:shade val="94000"/>
+                <a:satMod val="135000"/>
+              </a:schemeClr>
+            </a:gs>
+          </a:gsLst>
+          <a:lin ang="16200000" scaled="0"/>
+        </a:gradFill>
+      </a:fillStyleLst>
+      <a:lnStyleLst>
+        <a:ln w="9525" cap="flat" cmpd="sng" algn="ctr">
+          <a:solidFill>
+            <a:schemeClr val="phClr">
+              <a:shade val="95000"/>
+              <a:satMod val="105000"/>
+            </a:schemeClr>
+          </a:solidFill>
+          <a:prstDash val="solid"/>
+        </a:ln>
+        <a:ln w="25400" cap="flat" cmpd="sng" algn="ctr">
+          <a:solidFill>
+            <a:schemeClr val="phClr"/>
+          </a:solidFill>
+          <a:prstDash val="solid"/>
+        </a:ln>
+        <a:ln w="38100" cap="flat" cmpd="sng" algn="ctr">
+          <a:solidFill>
+            <a:schemeClr val="phClr"/>
+          </a:solidFill>
+          <a:prstDash val="solid"/>
+        </a:ln>
+      </a:lnStyleLst>
+      <a:effectStyleLst>
+        <a:effectStyle>
+          <a:effectLst>
+            <a:outerShdw blurRad="40000" dist="20000" dir="5400000" rotWithShape="0">
+              <a:srgbClr val="000000">
+                <a:alpha val="38000"/>
+              </a:srgbClr>
+            </a:outerShdw>
+          </a:effectLst>
+        </a:effectStyle>
+        <a:effectStyle>
+          <a:effectLst>
+            <a:outerShdw blurRad="40000" dist="23000" dir="5400000" rotWithShape="0">
+              <a:srgbClr val="000000">
+                <a:alpha val="35000"/>
+              </a:srgbClr>
+            </a:outerShdw>
+          </a:effectLst>
+        </a:effectStyle>
+        <a:effectStyle>
+          <a:effectLst>
+            <a:outerShdw blurRad="40000" dist="23000" dir="5400000" rotWithShape="0">
+              <a:srgbClr val="000000">
+                <a:alpha val="35000"/>
+              </a:srgbClr>
+            </a:outerShdw>
+          </a:effectLst>
+          <a:scene3d>
+            <a:camera prst="orthographicFront">
+              <a:rot lat="0" lon="0" rev="0"/>
+            </a:camera>
+            <a:lightRig rig="threePt" dir="t">
+              <a:rot lat="0" lon="0" rev="1200000"/>
+            </a:lightRig>
+          </a:scene3d>
+          <a:sp3d>
+            <a:bevelT w="63500" h="25400"/>
+          </a:sp3d>
+        </a:effectStyle>
+      </a:effectStyleLst>
+      <a:bgFillStyleLst>
+        <a:solidFill>
+          <a:schemeClr val="phClr"/>
+        </a:solidFill>
+        <a:gradFill rotWithShape="1">
+          <a:gsLst>
+            <a:gs pos="0">
+              <a:schemeClr val="phClr">
+                <a:tint val="40000"/>
+                <a:satMod val="350000"/>
+              </a:schemeClr>
+            </a:gs>
+            <a:gs pos="40000">
+              <a:schemeClr val="phClr">
+                <a:tint val="45000"/>
+                <a:shade val="99000"/>
+                <a:satMod val="350000"/>
+              </a:schemeClr>
+            </a:gs>
+            <a:gs pos="100000">
+              <a:schemeClr val="phClr">
+                <a:shade val="20000"/>
+                <a:satMod val="255000"/>
+              </a:schemeClr>
+            </a:gs>
+          </a:gsLst>
+          <a:path path="circle">
+            <a:fillToRect l="50000" t="-80000" r="50000" b="180000"/>
+          </a:path>
+        </a:gradFill>
+        <a:gradFill rotWithShape="1">
+          <a:gsLst>
+            <a:gs pos="0">
+              <a:schemeClr val="phClr">
+                <a:tint val="80000"/>
+                <a:satMod val="300000"/>
+              </a:schemeClr>
+            </a:gs>
+            <a:gs pos="100000">
+              <a:schemeClr val="phClr">
+                <a:shade val="30000"/>
+                <a:satMod val="200000"/>
+              </a:schemeClr>
+            </a:gs>
+          </a:gsLst>
+          <a:path path="circle">
+            <a:fillToRect l="50000" t="50000" r="50000" b="50000"/>
+          </a:path>
+        </a:gradFill>
+      </a:bgFillStyleLst>
+    </a:fmtScheme>
+  </a:themeElements>
+  <a:objectDefaults/>
+  <a:extraClrSchemeLst/>
+</a:theme>
 </file>
</xml_diff>

<commit_message>
Poster finalized for poster preview
Additional figures added, rotated back to correct orientation
</commit_message>
<xml_diff>
--- a/Clinic_poster_template_36x56.pptx
+++ b/Clinic_poster_template_36x56.pptx
@@ -10,7 +10,7 @@
   <p:sldIdLst>
     <p:sldId id="256" r:id="rId2"/>
   </p:sldIdLst>
-  <p:sldSz cx="51206400" cy="32918400"/>
+  <p:sldSz cx="32918400" cy="51206400"/>
   <p:notesSz cx="6858000" cy="9144000"/>
   <p:defaultTextStyle>
     <a:defPPr>
@@ -109,7 +109,7 @@
   </p:defaultTextStyle>
   <p:extLst>
     <p:ext uri="{EFAFB233-063F-42B5-8137-9DF3F51BA10A}">
-      <p15:sldGuideLst xmlns:p15="http://schemas.microsoft.com/office/powerpoint/2012/main" xmlns="">
+      <p15:sldGuideLst xmlns="" xmlns:p15="http://schemas.microsoft.com/office/powerpoint/2012/main">
         <p15:guide id="1" orient="horz" pos="16128" userDrawn="1">
           <p15:clr>
             <a:srgbClr val="A4A3A4"/>
@@ -226,8 +226,8 @@
         </p:nvSpPr>
         <p:spPr>
           <a:xfrm>
-            <a:off x="762000" y="685800"/>
-            <a:ext cx="5334000" cy="3429000"/>
+            <a:off x="2327275" y="685800"/>
+            <a:ext cx="2203450" cy="3429000"/>
           </a:xfrm>
           <a:prstGeom prst="rect">
             <a:avLst/>
@@ -505,8 +505,8 @@
         </p:nvSpPr>
         <p:spPr>
           <a:xfrm>
-            <a:off x="762000" y="685800"/>
-            <a:ext cx="5334000" cy="3429000"/>
+            <a:off x="2327275" y="685800"/>
+            <a:ext cx="2203450" cy="3429000"/>
           </a:xfrm>
         </p:spPr>
       </p:sp>
@@ -594,8 +594,8 @@
         </p:nvSpPr>
         <p:spPr>
           <a:xfrm>
-            <a:off x="3840480" y="10226042"/>
-            <a:ext cx="43525440" cy="7056120"/>
+            <a:off x="2468880" y="15907176"/>
+            <a:ext cx="27980640" cy="10976187"/>
           </a:xfrm>
         </p:spPr>
         <p:txBody>
@@ -622,8 +622,8 @@
         </p:nvSpPr>
         <p:spPr>
           <a:xfrm>
-            <a:off x="7680960" y="18653760"/>
-            <a:ext cx="35844480" cy="8412480"/>
+            <a:off x="4937760" y="29016960"/>
+            <a:ext cx="23042880" cy="13086080"/>
           </a:xfrm>
         </p:spPr>
         <p:txBody>
@@ -1006,8 +1006,8 @@
         </p:nvSpPr>
         <p:spPr>
           <a:xfrm>
-            <a:off x="207901541" y="6324600"/>
-            <a:ext cx="64514733" cy="134820662"/>
+            <a:off x="133650991" y="9838267"/>
+            <a:ext cx="41473757" cy="209721030"/>
           </a:xfrm>
         </p:spPr>
         <p:txBody>
@@ -1034,8 +1034,8 @@
         </p:nvSpPr>
         <p:spPr>
           <a:xfrm>
-            <a:off x="14339577" y="6324600"/>
-            <a:ext cx="192708527" cy="134820662"/>
+            <a:off x="9218300" y="9838267"/>
+            <a:ext cx="123884053" cy="209721030"/>
           </a:xfrm>
         </p:spPr>
         <p:txBody>
@@ -1356,8 +1356,8 @@
         </p:nvSpPr>
         <p:spPr>
           <a:xfrm>
-            <a:off x="4044953" y="21153122"/>
-            <a:ext cx="43525440" cy="6537960"/>
+            <a:off x="2600327" y="32904856"/>
+            <a:ext cx="27980640" cy="10170160"/>
           </a:xfrm>
         </p:spPr>
         <p:txBody>
@@ -1388,8 +1388,8 @@
         </p:nvSpPr>
         <p:spPr>
           <a:xfrm>
-            <a:off x="4044953" y="13952225"/>
-            <a:ext cx="43525440" cy="7200898"/>
+            <a:off x="2600327" y="21703461"/>
+            <a:ext cx="27980640" cy="11201397"/>
           </a:xfrm>
         </p:spPr>
         <p:txBody>
@@ -1625,8 +1625,8 @@
         </p:nvSpPr>
         <p:spPr>
           <a:xfrm>
-            <a:off x="14339574" y="36865560"/>
-            <a:ext cx="128611627" cy="104279702"/>
+            <a:off x="9218298" y="57346427"/>
+            <a:ext cx="82678903" cy="162212870"/>
           </a:xfrm>
         </p:spPr>
         <p:txBody>
@@ -1710,8 +1710,8 @@
         </p:nvSpPr>
         <p:spPr>
           <a:xfrm>
-            <a:off x="143804644" y="36865560"/>
-            <a:ext cx="128611633" cy="104279702"/>
+            <a:off x="92445843" y="57346427"/>
+            <a:ext cx="82678907" cy="162212870"/>
           </a:xfrm>
         </p:spPr>
         <p:txBody>
@@ -1890,8 +1890,8 @@
         </p:nvSpPr>
         <p:spPr>
           <a:xfrm>
-            <a:off x="2560320" y="1318262"/>
-            <a:ext cx="46085760" cy="5486400"/>
+            <a:off x="1645920" y="2050630"/>
+            <a:ext cx="29626560" cy="8534400"/>
           </a:xfrm>
         </p:spPr>
         <p:txBody>
@@ -1922,8 +1922,8 @@
         </p:nvSpPr>
         <p:spPr>
           <a:xfrm>
-            <a:off x="2560321" y="7368542"/>
-            <a:ext cx="22625053" cy="3070858"/>
+            <a:off x="1645921" y="11462177"/>
+            <a:ext cx="14544677" cy="4776890"/>
           </a:xfrm>
         </p:spPr>
         <p:txBody>
@@ -1987,8 +1987,8 @@
         </p:nvSpPr>
         <p:spPr>
           <a:xfrm>
-            <a:off x="2560321" y="10439400"/>
-            <a:ext cx="22625053" cy="18966182"/>
+            <a:off x="1645921" y="16239067"/>
+            <a:ext cx="14544677" cy="29502950"/>
           </a:xfrm>
         </p:spPr>
         <p:txBody>
@@ -2072,8 +2072,8 @@
         </p:nvSpPr>
         <p:spPr>
           <a:xfrm>
-            <a:off x="26012143" y="7368542"/>
-            <a:ext cx="22633940" cy="3070858"/>
+            <a:off x="16722092" y="11462177"/>
+            <a:ext cx="14550390" cy="4776890"/>
           </a:xfrm>
         </p:spPr>
         <p:txBody>
@@ -2137,8 +2137,8 @@
         </p:nvSpPr>
         <p:spPr>
           <a:xfrm>
-            <a:off x="26012143" y="10439400"/>
-            <a:ext cx="22633940" cy="18966182"/>
+            <a:off x="16722092" y="16239067"/>
+            <a:ext cx="14550390" cy="29502950"/>
           </a:xfrm>
         </p:spPr>
         <p:txBody>
@@ -2530,8 +2530,8 @@
         </p:nvSpPr>
         <p:spPr>
           <a:xfrm>
-            <a:off x="2560324" y="1310640"/>
-            <a:ext cx="16846553" cy="5577840"/>
+            <a:off x="1645923" y="2038773"/>
+            <a:ext cx="10829927" cy="8676640"/>
           </a:xfrm>
         </p:spPr>
         <p:txBody>
@@ -2562,8 +2562,8 @@
         </p:nvSpPr>
         <p:spPr>
           <a:xfrm>
-            <a:off x="20020280" y="1310643"/>
-            <a:ext cx="28625800" cy="28094942"/>
+            <a:off x="12870180" y="2038778"/>
+            <a:ext cx="18402300" cy="43703243"/>
           </a:xfrm>
         </p:spPr>
         <p:txBody>
@@ -2647,8 +2647,8 @@
         </p:nvSpPr>
         <p:spPr>
           <a:xfrm>
-            <a:off x="2560324" y="6888483"/>
-            <a:ext cx="16846553" cy="22517102"/>
+            <a:off x="1645923" y="10715418"/>
+            <a:ext cx="10829927" cy="35026603"/>
           </a:xfrm>
         </p:spPr>
         <p:txBody>
@@ -2807,8 +2807,8 @@
         </p:nvSpPr>
         <p:spPr>
           <a:xfrm>
-            <a:off x="10036813" y="23042880"/>
-            <a:ext cx="30723840" cy="2720342"/>
+            <a:off x="6452237" y="35844480"/>
+            <a:ext cx="19751040" cy="4231643"/>
           </a:xfrm>
         </p:spPr>
         <p:txBody>
@@ -2839,8 +2839,8 @@
         </p:nvSpPr>
         <p:spPr>
           <a:xfrm>
-            <a:off x="10036813" y="2941320"/>
-            <a:ext cx="30723840" cy="19751040"/>
+            <a:off x="6452237" y="4575387"/>
+            <a:ext cx="19751040" cy="30723840"/>
           </a:xfrm>
         </p:spPr>
         <p:txBody>
@@ -2900,8 +2900,8 @@
         </p:nvSpPr>
         <p:spPr>
           <a:xfrm>
-            <a:off x="10036813" y="25763222"/>
-            <a:ext cx="30723840" cy="3863338"/>
+            <a:off x="6452237" y="40076123"/>
+            <a:ext cx="19751040" cy="6009637"/>
           </a:xfrm>
         </p:spPr>
         <p:txBody>
@@ -3065,8 +3065,8 @@
         </p:nvSpPr>
         <p:spPr>
           <a:xfrm>
-            <a:off x="2560320" y="1318262"/>
-            <a:ext cx="46085760" cy="5486400"/>
+            <a:off x="1645920" y="2050630"/>
+            <a:ext cx="29626560" cy="8534400"/>
           </a:xfrm>
           <a:prstGeom prst="rect">
             <a:avLst/>
@@ -3098,8 +3098,8 @@
         </p:nvSpPr>
         <p:spPr>
           <a:xfrm>
-            <a:off x="2560320" y="7680963"/>
-            <a:ext cx="46085760" cy="21724622"/>
+            <a:off x="1645920" y="11948165"/>
+            <a:ext cx="29626560" cy="33793856"/>
           </a:xfrm>
           <a:prstGeom prst="rect">
             <a:avLst/>
@@ -3160,8 +3160,8 @@
         </p:nvSpPr>
         <p:spPr>
           <a:xfrm>
-            <a:off x="2560320" y="30510483"/>
-            <a:ext cx="11948160" cy="1752600"/>
+            <a:off x="1645920" y="47460751"/>
+            <a:ext cx="7680960" cy="2726267"/>
           </a:xfrm>
           <a:prstGeom prst="rect">
             <a:avLst/>
@@ -3201,8 +3201,8 @@
         </p:nvSpPr>
         <p:spPr>
           <a:xfrm>
-            <a:off x="17495520" y="30510483"/>
-            <a:ext cx="16215360" cy="1752600"/>
+            <a:off x="11247120" y="47460751"/>
+            <a:ext cx="10424160" cy="2726267"/>
           </a:xfrm>
           <a:prstGeom prst="rect">
             <a:avLst/>
@@ -3238,8 +3238,8 @@
         </p:nvSpPr>
         <p:spPr>
           <a:xfrm>
-            <a:off x="36697920" y="30510483"/>
-            <a:ext cx="11948160" cy="1752600"/>
+            <a:off x="23591520" y="47460751"/>
+            <a:ext cx="7680960" cy="2726267"/>
           </a:xfrm>
           <a:prstGeom prst="rect">
             <a:avLst/>
@@ -3566,8 +3566,8 @@
         </p:nvSpPr>
         <p:spPr>
           <a:xfrm>
-            <a:off x="457200" y="6019800"/>
-            <a:ext cx="51206400" cy="188945"/>
+            <a:off x="293914" y="9364134"/>
+            <a:ext cx="32918400" cy="293914"/>
           </a:xfrm>
           <a:prstGeom prst="rect">
             <a:avLst/>
@@ -3626,7 +3626,7 @@
         </p:blipFill>
         <p:spPr>
           <a:xfrm>
-            <a:off x="1295400" y="1007380"/>
+            <a:off x="832757" y="1567036"/>
             <a:ext cx="3657600" cy="3657600"/>
           </a:xfrm>
           <a:prstGeom prst="rect">
@@ -3656,7 +3656,7 @@
         </p:blipFill>
         <p:spPr>
           <a:xfrm>
-            <a:off x="46405800" y="930954"/>
+            <a:off x="28354597" y="1171453"/>
             <a:ext cx="3657600" cy="3657600"/>
           </a:xfrm>
           <a:prstGeom prst="rect">
@@ -3672,8 +3672,8 @@
         </p:nvSpPr>
         <p:spPr>
           <a:xfrm>
-            <a:off x="14897100" y="930954"/>
-            <a:ext cx="22326600" cy="3016210"/>
+            <a:off x="6305162" y="2208426"/>
+            <a:ext cx="19888200" cy="3016210"/>
           </a:xfrm>
           <a:prstGeom prst="rect">
             <a:avLst/>
@@ -3703,8 +3703,8 @@
         </p:nvSpPr>
         <p:spPr>
           <a:xfrm>
-            <a:off x="16154400" y="3695484"/>
-            <a:ext cx="19812000" cy="1938992"/>
+            <a:off x="7191181" y="5657372"/>
+            <a:ext cx="18116162" cy="1938992"/>
           </a:xfrm>
           <a:prstGeom prst="rect">
             <a:avLst/>
@@ -3772,8 +3772,8 @@
         </p:blipFill>
         <p:spPr>
           <a:xfrm>
-            <a:off x="41376600" y="2261617"/>
-            <a:ext cx="2730551" cy="1685547"/>
+            <a:off x="28354597" y="5908799"/>
+            <a:ext cx="2730863" cy="1687565"/>
           </a:xfrm>
           <a:prstGeom prst="rect">
             <a:avLst/>
@@ -3789,20 +3789,20 @@
           <p:nvPr>
             <p:extLst>
               <p:ext uri="{D42A27DB-BD31-4B8C-83A1-F6EECF244321}">
-                <p14:modId xmlns:p14="http://schemas.microsoft.com/office/powerpoint/2010/main" val="729116582"/>
+                <p14:modId xmlns:p14="http://schemas.microsoft.com/office/powerpoint/2010/main" val="1618373898"/>
               </p:ext>
             </p:extLst>
           </p:nvPr>
         </p:nvGraphicFramePr>
         <p:xfrm>
-          <a:off x="42405300" y="8707248"/>
-          <a:ext cx="5829300" cy="7543800"/>
+          <a:off x="23688011" y="12440137"/>
+          <a:ext cx="5829199" cy="7543800"/>
         </p:xfrm>
         <a:graphic>
           <a:graphicData uri="http://schemas.openxmlformats.org/presentationml/2006/ole">
             <mc:AlternateContent xmlns:mc="http://schemas.openxmlformats.org/markup-compatibility/2006">
               <mc:Choice xmlns:v="urn:schemas-microsoft-com:vml" Requires="v">
-                <p:oleObj spid="_x0000_s1027" name="Acrobat Document" r:id="rId7" imgW="5829199" imgH="7543800" progId="AcroExch.Document.11">
+                <p:oleObj spid="_x0000_s1028" name="Acrobat Document" r:id="rId7" imgW="5829199" imgH="7543800" progId="AcroExch.Document.11">
                   <p:embed/>
                 </p:oleObj>
               </mc:Choice>
@@ -3823,7 +3823,314 @@
                     </p:blipFill>
                     <p:spPr>
                       <a:xfrm>
-                        <a:off x="42405300" y="8707248"/>
+                        <a:off x="23688011" y="12440137"/>
+                        <a:ext cx="5829199" cy="7543800"/>
+                      </a:xfrm>
+                      <a:prstGeom prst="rect">
+                        <a:avLst/>
+                      </a:prstGeom>
+                    </p:spPr>
+                  </p:pic>
+                </p:oleObj>
+              </mc:Fallback>
+            </mc:AlternateContent>
+          </a:graphicData>
+        </a:graphic>
+      </p:graphicFrame>
+      <p:sp>
+        <p:nvSpPr>
+          <p:cNvPr id="12" name="TextBox 11"/>
+          <p:cNvSpPr txBox="1"/>
+          <p:nvPr/>
+        </p:nvSpPr>
+        <p:spPr>
+          <a:xfrm>
+            <a:off x="1476570" y="12445999"/>
+            <a:ext cx="11782230" cy="4478149"/>
+          </a:xfrm>
+          <a:prstGeom prst="rect">
+            <a:avLst/>
+          </a:prstGeom>
+          <a:noFill/>
+        </p:spPr>
+        <p:txBody>
+          <a:bodyPr wrap="square" rtlCol="0">
+            <a:spAutoFit/>
+          </a:bodyPr>
+          <a:lstStyle/>
+          <a:p>
+            <a:r>
+              <a:rPr lang="en-US" dirty="0" smtClean="0"/>
+              <a:t>This is 95-point font. It is the same as the title of the slide.</a:t>
+            </a:r>
+            <a:endParaRPr lang="en-US" dirty="0"/>
+          </a:p>
+        </p:txBody>
+      </p:sp>
+      <p:sp>
+        <p:nvSpPr>
+          <p:cNvPr id="13" name="TextBox 12"/>
+          <p:cNvSpPr txBox="1"/>
+          <p:nvPr/>
+        </p:nvSpPr>
+        <p:spPr>
+          <a:xfrm>
+            <a:off x="862065" y="17994379"/>
+            <a:ext cx="13230030" cy="2554545"/>
+          </a:xfrm>
+          <a:prstGeom prst="rect">
+            <a:avLst/>
+          </a:prstGeom>
+          <a:noFill/>
+        </p:spPr>
+        <p:txBody>
+          <a:bodyPr wrap="square" rtlCol="0">
+            <a:spAutoFit/>
+          </a:bodyPr>
+          <a:lstStyle/>
+          <a:p>
+            <a:r>
+              <a:rPr lang="en-US" sz="8000" dirty="0" smtClean="0"/>
+              <a:t>This is 80-point font. Sample text for comparison.</a:t>
+            </a:r>
+            <a:endParaRPr lang="en-US" sz="8000" dirty="0"/>
+          </a:p>
+        </p:txBody>
+      </p:sp>
+      <p:sp>
+        <p:nvSpPr>
+          <p:cNvPr id="14" name="TextBox 13"/>
+          <p:cNvSpPr txBox="1"/>
+          <p:nvPr/>
+        </p:nvSpPr>
+        <p:spPr>
+          <a:xfrm>
+            <a:off x="1476570" y="27172533"/>
+            <a:ext cx="11782230" cy="2308324"/>
+          </a:xfrm>
+          <a:prstGeom prst="rect">
+            <a:avLst/>
+          </a:prstGeom>
+          <a:noFill/>
+        </p:spPr>
+        <p:txBody>
+          <a:bodyPr wrap="square" rtlCol="0">
+            <a:spAutoFit/>
+          </a:bodyPr>
+          <a:lstStyle/>
+          <a:p>
+            <a:r>
+              <a:rPr lang="en-US" sz="7200" dirty="0" smtClean="0"/>
+              <a:t>This is 72-point font. Sample text for comparison.</a:t>
+            </a:r>
+            <a:endParaRPr lang="en-US" sz="7200" dirty="0"/>
+          </a:p>
+        </p:txBody>
+      </p:sp>
+      <p:sp>
+        <p:nvSpPr>
+          <p:cNvPr id="15" name="TextBox 14"/>
+          <p:cNvSpPr txBox="1"/>
+          <p:nvPr/>
+        </p:nvSpPr>
+        <p:spPr>
+          <a:xfrm>
+            <a:off x="1476570" y="38331099"/>
+            <a:ext cx="10486830" cy="5632311"/>
+          </a:xfrm>
+          <a:prstGeom prst="rect">
+            <a:avLst/>
+          </a:prstGeom>
+          <a:noFill/>
+        </p:spPr>
+        <p:txBody>
+          <a:bodyPr wrap="square" rtlCol="0">
+            <a:spAutoFit/>
+          </a:bodyPr>
+          <a:lstStyle/>
+          <a:p>
+            <a:r>
+              <a:rPr lang="en-US" sz="6000" dirty="0" smtClean="0"/>
+              <a:t>This is 60-point font. It is the same size as the names under the title. We may use this for the body of the text, so here is a lengthier sample so we can see how it looks as a paragraph.</a:t>
+            </a:r>
+            <a:endParaRPr lang="en-US" sz="6000" dirty="0"/>
+          </a:p>
+        </p:txBody>
+      </p:sp>
+      <p:sp>
+        <p:nvSpPr>
+          <p:cNvPr id="16" name="TextBox 15"/>
+          <p:cNvSpPr txBox="1"/>
+          <p:nvPr/>
+        </p:nvSpPr>
+        <p:spPr>
+          <a:xfrm>
+            <a:off x="21160798" y="19812000"/>
+            <a:ext cx="9924662" cy="4524315"/>
+          </a:xfrm>
+          <a:prstGeom prst="rect">
+            <a:avLst/>
+          </a:prstGeom>
+          <a:noFill/>
+        </p:spPr>
+        <p:txBody>
+          <a:bodyPr wrap="square" rtlCol="0">
+            <a:spAutoFit/>
+          </a:bodyPr>
+          <a:lstStyle/>
+          <a:p>
+            <a:r>
+              <a:rPr lang="en-US" sz="4800" dirty="0" smtClean="0"/>
+              <a:t>This is 48-point font. We may use this for the body of the text, so here is some lengthier text.  This text should be easily readable in paragraph form, but small enough that we can include all the text that we want.</a:t>
+            </a:r>
+            <a:endParaRPr lang="en-US" sz="4800" dirty="0"/>
+          </a:p>
+        </p:txBody>
+      </p:sp>
+      <p:sp>
+        <p:nvSpPr>
+          <p:cNvPr id="17" name="TextBox 16"/>
+          <p:cNvSpPr txBox="1"/>
+          <p:nvPr/>
+        </p:nvSpPr>
+        <p:spPr>
+          <a:xfrm>
+            <a:off x="20755708" y="35737800"/>
+            <a:ext cx="9748157" cy="3416320"/>
+          </a:xfrm>
+          <a:prstGeom prst="rect">
+            <a:avLst/>
+          </a:prstGeom>
+          <a:noFill/>
+        </p:spPr>
+        <p:txBody>
+          <a:bodyPr wrap="square" rtlCol="0">
+            <a:spAutoFit/>
+          </a:bodyPr>
+          <a:lstStyle/>
+          <a:p>
+            <a:r>
+              <a:rPr lang="en-US" sz="3600" dirty="0"/>
+              <a:t>This is </a:t>
+            </a:r>
+            <a:r>
+              <a:rPr lang="en-US" sz="3600" dirty="0" smtClean="0"/>
+              <a:t>36-point </a:t>
+            </a:r>
+            <a:r>
+              <a:rPr lang="en-US" sz="3600" dirty="0"/>
+              <a:t>font. We may use this for the body of the text, so here is some lengthier text.  This text should be easily readable in paragraph form, but small enough that we can include all the text that we want.</a:t>
+            </a:r>
+          </a:p>
+          <a:p>
+            <a:endParaRPr lang="en-US" sz="3600" dirty="0"/>
+          </a:p>
+        </p:txBody>
+      </p:sp>
+      <p:pic>
+        <p:nvPicPr>
+          <p:cNvPr id="6" name="Picture 5"/>
+          <p:cNvPicPr>
+            <a:picLocks noChangeAspect="1"/>
+          </p:cNvPicPr>
+          <p:nvPr/>
+        </p:nvPicPr>
+        <p:blipFill>
+          <a:blip r:embed="rId9">
+            <a:extLst>
+              <a:ext uri="{28A0092B-C50C-407E-A947-70E740481C1C}">
+                <a14:useLocalDpi xmlns:a14="http://schemas.microsoft.com/office/drawing/2010/main" val="0"/>
+              </a:ext>
+            </a:extLst>
+          </a:blip>
+          <a:stretch>
+            <a:fillRect/>
+          </a:stretch>
+        </p:blipFill>
+        <p:spPr>
+          <a:xfrm>
+            <a:off x="2949871" y="20548924"/>
+            <a:ext cx="6985275" cy="5925010"/>
+          </a:xfrm>
+          <a:prstGeom prst="rect">
+            <a:avLst/>
+          </a:prstGeom>
+        </p:spPr>
+      </p:pic>
+      <p:pic>
+        <p:nvPicPr>
+          <p:cNvPr id="7" name="Picture 6"/>
+          <p:cNvPicPr>
+            <a:picLocks noChangeAspect="1"/>
+          </p:cNvPicPr>
+          <p:nvPr/>
+        </p:nvPicPr>
+        <p:blipFill>
+          <a:blip r:embed="rId10">
+            <a:extLst>
+              <a:ext uri="{28A0092B-C50C-407E-A947-70E740481C1C}">
+                <a14:useLocalDpi xmlns:a14="http://schemas.microsoft.com/office/drawing/2010/main" val="0"/>
+              </a:ext>
+            </a:extLst>
+          </a:blip>
+          <a:stretch>
+            <a:fillRect/>
+          </a:stretch>
+        </p:blipFill>
+        <p:spPr>
+          <a:xfrm>
+            <a:off x="2661557" y="31993336"/>
+            <a:ext cx="7561905" cy="4647619"/>
+          </a:xfrm>
+          <a:prstGeom prst="rect">
+            <a:avLst/>
+          </a:prstGeom>
+        </p:spPr>
+      </p:pic>
+      <p:graphicFrame>
+        <p:nvGraphicFramePr>
+          <p:cNvPr id="10" name="Object 9"/>
+          <p:cNvGraphicFramePr>
+            <a:graphicFrameLocks noChangeAspect="1"/>
+          </p:cNvGraphicFramePr>
+          <p:nvPr>
+            <p:extLst>
+              <p:ext uri="{D42A27DB-BD31-4B8C-83A1-F6EECF244321}">
+                <p14:modId xmlns:p14="http://schemas.microsoft.com/office/powerpoint/2010/main" val="50040992"/>
+              </p:ext>
+            </p:extLst>
+          </p:nvPr>
+        </p:nvGraphicFramePr>
+        <p:xfrm>
+          <a:off x="22715136" y="25708957"/>
+          <a:ext cx="5829300" cy="7543800"/>
+        </p:xfrm>
+        <a:graphic>
+          <a:graphicData uri="http://schemas.openxmlformats.org/presentationml/2006/ole">
+            <mc:AlternateContent xmlns:mc="http://schemas.openxmlformats.org/markup-compatibility/2006">
+              <mc:Choice xmlns:v="urn:schemas-microsoft-com:vml" Requires="v">
+                <p:oleObj spid="_x0000_s1029" name="Acrobat Document" r:id="rId11" imgW="5829199" imgH="7543800" progId="AcroExch.Document.11">
+                  <p:embed/>
+                </p:oleObj>
+              </mc:Choice>
+              <mc:Fallback>
+                <p:oleObj name="Acrobat Document" r:id="rId11" imgW="5829199" imgH="7543800" progId="AcroExch.Document.11">
+                  <p:embed/>
+                  <p:pic>
+                    <p:nvPicPr>
+                      <p:cNvPr id="0" name=""/>
+                      <p:cNvPicPr/>
+                      <p:nvPr/>
+                    </p:nvPicPr>
+                    <p:blipFill>
+                      <a:blip r:embed="rId12"/>
+                      <a:stretch>
+                        <a:fillRect/>
+                      </a:stretch>
+                    </p:blipFill>
+                    <p:spPr>
+                      <a:xfrm>
+                        <a:off x="22715136" y="25708957"/>
                         <a:ext cx="5829300" cy="7543800"/>
                       </a:xfrm>
                       <a:prstGeom prst="rect">
@@ -3837,196 +4144,6 @@
           </a:graphicData>
         </a:graphic>
       </p:graphicFrame>
-      <p:sp>
-        <p:nvSpPr>
-          <p:cNvPr id="12" name="TextBox 11"/>
-          <p:cNvSpPr txBox="1"/>
-          <p:nvPr/>
-        </p:nvSpPr>
-        <p:spPr>
-          <a:xfrm>
-            <a:off x="2296886" y="8000999"/>
-            <a:ext cx="13868400" cy="4478149"/>
-          </a:xfrm>
-          <a:prstGeom prst="rect">
-            <a:avLst/>
-          </a:prstGeom>
-          <a:noFill/>
-        </p:spPr>
-        <p:txBody>
-          <a:bodyPr wrap="square" rtlCol="0">
-            <a:spAutoFit/>
-          </a:bodyPr>
-          <a:lstStyle/>
-          <a:p>
-            <a:r>
-              <a:rPr lang="en-US" dirty="0" smtClean="0"/>
-              <a:t>This is 95-point font. It is the same as the title of the slide.</a:t>
-            </a:r>
-            <a:endParaRPr lang="en-US" dirty="0"/>
-          </a:p>
-        </p:txBody>
-      </p:sp>
-      <p:sp>
-        <p:nvSpPr>
-          <p:cNvPr id="13" name="TextBox 12"/>
-          <p:cNvSpPr txBox="1"/>
-          <p:nvPr/>
-        </p:nvSpPr>
-        <p:spPr>
-          <a:xfrm>
-            <a:off x="2296886" y="14630400"/>
-            <a:ext cx="13868400" cy="2554545"/>
-          </a:xfrm>
-          <a:prstGeom prst="rect">
-            <a:avLst/>
-          </a:prstGeom>
-          <a:noFill/>
-        </p:spPr>
-        <p:txBody>
-          <a:bodyPr wrap="square" rtlCol="0">
-            <a:spAutoFit/>
-          </a:bodyPr>
-          <a:lstStyle/>
-          <a:p>
-            <a:r>
-              <a:rPr lang="en-US" sz="8000" dirty="0" smtClean="0"/>
-              <a:t>This is 80-point font. Sample text for comparison.</a:t>
-            </a:r>
-            <a:endParaRPr lang="en-US" sz="8000" dirty="0"/>
-          </a:p>
-        </p:txBody>
-      </p:sp>
-      <p:sp>
-        <p:nvSpPr>
-          <p:cNvPr id="14" name="TextBox 13"/>
-          <p:cNvSpPr txBox="1"/>
-          <p:nvPr/>
-        </p:nvSpPr>
-        <p:spPr>
-          <a:xfrm>
-            <a:off x="2296886" y="19202400"/>
-            <a:ext cx="13857514" cy="2308324"/>
-          </a:xfrm>
-          <a:prstGeom prst="rect">
-            <a:avLst/>
-          </a:prstGeom>
-          <a:noFill/>
-        </p:spPr>
-        <p:txBody>
-          <a:bodyPr wrap="square" rtlCol="0">
-            <a:spAutoFit/>
-          </a:bodyPr>
-          <a:lstStyle/>
-          <a:p>
-            <a:r>
-              <a:rPr lang="en-US" sz="7200" dirty="0" smtClean="0"/>
-              <a:t>This is 72-point font. Sample text for comparison.</a:t>
-            </a:r>
-            <a:endParaRPr lang="en-US" sz="7200" dirty="0"/>
-          </a:p>
-        </p:txBody>
-      </p:sp>
-      <p:sp>
-        <p:nvSpPr>
-          <p:cNvPr id="15" name="TextBox 14"/>
-          <p:cNvSpPr txBox="1"/>
-          <p:nvPr/>
-        </p:nvSpPr>
-        <p:spPr>
-          <a:xfrm>
-            <a:off x="2296886" y="23894810"/>
-            <a:ext cx="13868400" cy="4708981"/>
-          </a:xfrm>
-          <a:prstGeom prst="rect">
-            <a:avLst/>
-          </a:prstGeom>
-          <a:noFill/>
-        </p:spPr>
-        <p:txBody>
-          <a:bodyPr wrap="square" rtlCol="0">
-            <a:spAutoFit/>
-          </a:bodyPr>
-          <a:lstStyle/>
-          <a:p>
-            <a:r>
-              <a:rPr lang="en-US" sz="6000" dirty="0" smtClean="0"/>
-              <a:t>This is 60-point font. It is the same size as the names under the title. We may use this for the body of the text, so here is a lengthier sample so we can see how it looks as a paragraph.</a:t>
-            </a:r>
-            <a:endParaRPr lang="en-US" sz="6000" dirty="0"/>
-          </a:p>
-        </p:txBody>
-      </p:sp>
-      <p:sp>
-        <p:nvSpPr>
-          <p:cNvPr id="16" name="TextBox 15"/>
-          <p:cNvSpPr txBox="1"/>
-          <p:nvPr/>
-        </p:nvSpPr>
-        <p:spPr>
-          <a:xfrm>
-            <a:off x="33811029" y="17184945"/>
-            <a:ext cx="13868400" cy="3046988"/>
-          </a:xfrm>
-          <a:prstGeom prst="rect">
-            <a:avLst/>
-          </a:prstGeom>
-          <a:noFill/>
-        </p:spPr>
-        <p:txBody>
-          <a:bodyPr wrap="square" rtlCol="0">
-            <a:spAutoFit/>
-          </a:bodyPr>
-          <a:lstStyle/>
-          <a:p>
-            <a:r>
-              <a:rPr lang="en-US" sz="4800" dirty="0" smtClean="0"/>
-              <a:t>This is 48-point font. We may use this for the body of the text, so here is some lengthier text.  This text should be easily readable in paragraph form, but small enough that we can include all the text that we want.</a:t>
-            </a:r>
-            <a:endParaRPr lang="en-US" sz="4800" dirty="0"/>
-          </a:p>
-        </p:txBody>
-      </p:sp>
-      <p:sp>
-        <p:nvSpPr>
-          <p:cNvPr id="17" name="TextBox 16"/>
-          <p:cNvSpPr txBox="1"/>
-          <p:nvPr/>
-        </p:nvSpPr>
-        <p:spPr>
-          <a:xfrm>
-            <a:off x="34366200" y="26295467"/>
-            <a:ext cx="13868400" cy="2308324"/>
-          </a:xfrm>
-          <a:prstGeom prst="rect">
-            <a:avLst/>
-          </a:prstGeom>
-          <a:noFill/>
-        </p:spPr>
-        <p:txBody>
-          <a:bodyPr wrap="square" rtlCol="0">
-            <a:spAutoFit/>
-          </a:bodyPr>
-          <a:lstStyle/>
-          <a:p>
-            <a:r>
-              <a:rPr lang="en-US" sz="3600" dirty="0"/>
-              <a:t>This is </a:t>
-            </a:r>
-            <a:r>
-              <a:rPr lang="en-US" sz="3600" dirty="0" smtClean="0"/>
-              <a:t>36-point </a:t>
-            </a:r>
-            <a:r>
-              <a:rPr lang="en-US" sz="3600" dirty="0"/>
-              <a:t>font. We may use this for the body of the text, so here is some lengthier text.  This text should be easily readable in paragraph form, but small enough that we can include all the text that we want.</a:t>
-            </a:r>
-          </a:p>
-          <a:p>
-            <a:endParaRPr lang="en-US" sz="3600" dirty="0"/>
-          </a:p>
-        </p:txBody>
-      </p:sp>
     </p:spTree>
     <p:extLst>
       <p:ext uri="{BB962C8B-B14F-4D97-AF65-F5344CB8AC3E}">

</xml_diff>